<commit_message>
updating the poster, still need to do the rewrite and presentation.
</commit_message>
<xml_diff>
--- a/doc/Cer2016_Femke Thon & Jolien Gay_FINAL.pptx
+++ b/doc/Cer2016_Femke Thon & Jolien Gay_FINAL.pptx
@@ -125,7 +125,7 @@
   </p:defaultTextStyle>
   <p:extLst>
     <p:ext uri="{EFAFB233-063F-42B5-8137-9DF3F51BA10A}">
-      <p15:sldGuideLst xmlns:p15="http://schemas.microsoft.com/office/powerpoint/2012/main" xmlns="">
+      <p15:sldGuideLst xmlns:p15="http://schemas.microsoft.com/office/powerpoint/2012/main">
         <p15:guide id="1" orient="horz" pos="2160">
           <p15:clr>
             <a:srgbClr val="A4A3A4"/>
@@ -225,7 +225,7 @@
             <a:fld id="{31638245-5222-4875-B595-DAA9E1B2F047}" type="datetimeFigureOut">
               <a:rPr lang="en-GB" smtClean="0"/>
               <a:pPr/>
-              <a:t>27/05/2016</a:t>
+              <a:t>28/05/2016</a:t>
             </a:fld>
             <a:endParaRPr lang="en-GB"/>
           </a:p>
@@ -387,7 +387,7 @@
             <a:fld id="{9BBE7A90-5B18-44E6-896F-B56F6E25EE11}" type="slidenum">
               <a:rPr lang="en-GB" smtClean="0"/>
               <a:pPr/>
-              <a:t>‹#›</a:t>
+              <a:t>‹nr.›</a:t>
             </a:fld>
             <a:endParaRPr lang="en-GB"/>
           </a:p>
@@ -396,7 +396,7 @@
     </p:spTree>
     <p:extLst>
       <p:ext uri="{BB962C8B-B14F-4D97-AF65-F5344CB8AC3E}">
-        <p14:creationId xmlns:p14="http://schemas.microsoft.com/office/powerpoint/2010/main" xmlns="" val="3689852174"/>
+        <p14:creationId xmlns:p14="http://schemas.microsoft.com/office/powerpoint/2010/main" val="3689852174"/>
       </p:ext>
     </p:extLst>
   </p:cSld>
@@ -573,7 +573,7 @@
     </p:spTree>
     <p:extLst>
       <p:ext uri="{BB962C8B-B14F-4D97-AF65-F5344CB8AC3E}">
-        <p14:creationId xmlns:p14="http://schemas.microsoft.com/office/powerpoint/2010/main" xmlns="" val="2596161602"/>
+        <p14:creationId xmlns:p14="http://schemas.microsoft.com/office/powerpoint/2010/main" val="2596161602"/>
       </p:ext>
     </p:extLst>
   </p:cSld>
@@ -660,7 +660,7 @@
     </p:spTree>
     <p:extLst>
       <p:ext uri="{BB962C8B-B14F-4D97-AF65-F5344CB8AC3E}">
-        <p14:creationId xmlns:p14="http://schemas.microsoft.com/office/powerpoint/2010/main" xmlns="" val="4122720026"/>
+        <p14:creationId xmlns:p14="http://schemas.microsoft.com/office/powerpoint/2010/main" val="4122720026"/>
       </p:ext>
     </p:extLst>
   </p:cSld>
@@ -747,7 +747,7 @@
     </p:spTree>
     <p:extLst>
       <p:ext uri="{BB962C8B-B14F-4D97-AF65-F5344CB8AC3E}">
-        <p14:creationId xmlns:p14="http://schemas.microsoft.com/office/powerpoint/2010/main" xmlns="" val="958227800"/>
+        <p14:creationId xmlns:p14="http://schemas.microsoft.com/office/powerpoint/2010/main" val="958227800"/>
       </p:ext>
     </p:extLst>
   </p:cSld>
@@ -838,7 +838,7 @@
     </p:spTree>
     <p:extLst>
       <p:ext uri="{BB962C8B-B14F-4D97-AF65-F5344CB8AC3E}">
-        <p14:creationId xmlns:p14="http://schemas.microsoft.com/office/powerpoint/2010/main" xmlns="" val="3137112786"/>
+        <p14:creationId xmlns:p14="http://schemas.microsoft.com/office/powerpoint/2010/main" val="3137112786"/>
       </p:ext>
     </p:extLst>
   </p:cSld>
@@ -997,7 +997,7 @@
     </p:spTree>
     <p:extLst>
       <p:ext uri="{BB962C8B-B14F-4D97-AF65-F5344CB8AC3E}">
-        <p14:creationId xmlns:p14="http://schemas.microsoft.com/office/powerpoint/2010/main" xmlns="" val="11305336"/>
+        <p14:creationId xmlns:p14="http://schemas.microsoft.com/office/powerpoint/2010/main" val="11305336"/>
       </p:ext>
     </p:extLst>
   </p:cSld>
@@ -1082,6 +1082,11 @@
         </p:txBody>
       </p:sp>
     </p:spTree>
+    <p:extLst>
+      <p:ext uri="{BB962C8B-B14F-4D97-AF65-F5344CB8AC3E}">
+        <p14:creationId xmlns:p14="http://schemas.microsoft.com/office/powerpoint/2010/main" val="1553940335"/>
+      </p:ext>
+    </p:extLst>
   </p:cSld>
   <p:clrMapOvr>
     <a:masterClrMapping/>
@@ -1222,7 +1227,7 @@
     </p:spTree>
     <p:extLst>
       <p:ext uri="{BB962C8B-B14F-4D97-AF65-F5344CB8AC3E}">
-        <p14:creationId xmlns:p14="http://schemas.microsoft.com/office/powerpoint/2010/main" xmlns="" val="2660152302"/>
+        <p14:creationId xmlns:p14="http://schemas.microsoft.com/office/powerpoint/2010/main" val="2660152302"/>
       </p:ext>
     </p:extLst>
   </p:cSld>
@@ -1468,7 +1473,7 @@
     </p:spTree>
     <p:extLst>
       <p:ext uri="{BB962C8B-B14F-4D97-AF65-F5344CB8AC3E}">
-        <p14:creationId xmlns:p14="http://schemas.microsoft.com/office/powerpoint/2010/main" xmlns="" val="2545523758"/>
+        <p14:creationId xmlns:p14="http://schemas.microsoft.com/office/powerpoint/2010/main" val="2545523758"/>
       </p:ext>
     </p:extLst>
   </p:cSld>
@@ -1555,7 +1560,7 @@
     </p:spTree>
     <p:extLst>
       <p:ext uri="{BB962C8B-B14F-4D97-AF65-F5344CB8AC3E}">
-        <p14:creationId xmlns:p14="http://schemas.microsoft.com/office/powerpoint/2010/main" xmlns="" val="3248569269"/>
+        <p14:creationId xmlns:p14="http://schemas.microsoft.com/office/powerpoint/2010/main" val="3248569269"/>
       </p:ext>
     </p:extLst>
   </p:cSld>
@@ -1664,7 +1669,7 @@
     </p:spTree>
     <p:extLst>
       <p:ext uri="{BB962C8B-B14F-4D97-AF65-F5344CB8AC3E}">
-        <p14:creationId xmlns:p14="http://schemas.microsoft.com/office/powerpoint/2010/main" xmlns="" val="3544749578"/>
+        <p14:creationId xmlns:p14="http://schemas.microsoft.com/office/powerpoint/2010/main" val="3544749578"/>
       </p:ext>
     </p:extLst>
   </p:cSld>
@@ -1856,7 +1861,7 @@
             <a:fld id="{1D8BD707-D9CF-40AE-B4C6-C98DA3205C09}" type="datetimeFigureOut">
               <a:rPr lang="en-US" smtClean="0"/>
               <a:pPr/>
-              <a:t>5/27/2016</a:t>
+              <a:t>5/28/2016</a:t>
             </a:fld>
             <a:endParaRPr lang="en-US"/>
           </a:p>
@@ -1899,7 +1904,7 @@
             <a:fld id="{B6F15528-21DE-4FAA-801E-634DDDAF4B2B}" type="slidenum">
               <a:rPr lang="en-US" smtClean="0"/>
               <a:pPr/>
-              <a:t>‹#›</a:t>
+              <a:t>‹nr.›</a:t>
             </a:fld>
             <a:endParaRPr lang="en-US"/>
           </a:p>
@@ -2023,7 +2028,7 @@
             <a:fld id="{1D8BD707-D9CF-40AE-B4C6-C98DA3205C09}" type="datetimeFigureOut">
               <a:rPr lang="en-US" smtClean="0"/>
               <a:pPr/>
-              <a:t>5/27/2016</a:t>
+              <a:t>5/28/2016</a:t>
             </a:fld>
             <a:endParaRPr lang="en-US"/>
           </a:p>
@@ -2066,7 +2071,7 @@
             <a:fld id="{B6F15528-21DE-4FAA-801E-634DDDAF4B2B}" type="slidenum">
               <a:rPr lang="en-US" smtClean="0"/>
               <a:pPr/>
-              <a:t>‹#›</a:t>
+              <a:t>‹nr.›</a:t>
             </a:fld>
             <a:endParaRPr lang="en-US"/>
           </a:p>
@@ -2200,7 +2205,7 @@
             <a:fld id="{1D8BD707-D9CF-40AE-B4C6-C98DA3205C09}" type="datetimeFigureOut">
               <a:rPr lang="en-US" smtClean="0"/>
               <a:pPr/>
-              <a:t>5/27/2016</a:t>
+              <a:t>5/28/2016</a:t>
             </a:fld>
             <a:endParaRPr lang="en-US"/>
           </a:p>
@@ -2243,7 +2248,7 @@
             <a:fld id="{B6F15528-21DE-4FAA-801E-634DDDAF4B2B}" type="slidenum">
               <a:rPr lang="en-US" smtClean="0"/>
               <a:pPr/>
-              <a:t>‹#›</a:t>
+              <a:t>‹nr.›</a:t>
             </a:fld>
             <a:endParaRPr lang="en-US"/>
           </a:p>
@@ -2367,7 +2372,7 @@
             <a:fld id="{1D8BD707-D9CF-40AE-B4C6-C98DA3205C09}" type="datetimeFigureOut">
               <a:rPr lang="en-US" smtClean="0"/>
               <a:pPr/>
-              <a:t>5/27/2016</a:t>
+              <a:t>5/28/2016</a:t>
             </a:fld>
             <a:endParaRPr lang="en-US"/>
           </a:p>
@@ -2410,7 +2415,7 @@
             <a:fld id="{B6F15528-21DE-4FAA-801E-634DDDAF4B2B}" type="slidenum">
               <a:rPr lang="en-US" smtClean="0"/>
               <a:pPr/>
-              <a:t>‹#›</a:t>
+              <a:t>‹nr.›</a:t>
             </a:fld>
             <a:endParaRPr lang="en-US"/>
           </a:p>
@@ -2610,7 +2615,7 @@
             <a:fld id="{1D8BD707-D9CF-40AE-B4C6-C98DA3205C09}" type="datetimeFigureOut">
               <a:rPr lang="en-US" smtClean="0"/>
               <a:pPr/>
-              <a:t>5/27/2016</a:t>
+              <a:t>5/28/2016</a:t>
             </a:fld>
             <a:endParaRPr lang="en-US"/>
           </a:p>
@@ -2653,7 +2658,7 @@
             <a:fld id="{B6F15528-21DE-4FAA-801E-634DDDAF4B2B}" type="slidenum">
               <a:rPr lang="en-US" smtClean="0"/>
               <a:pPr/>
-              <a:t>‹#›</a:t>
+              <a:t>‹nr.›</a:t>
             </a:fld>
             <a:endParaRPr lang="en-US"/>
           </a:p>
@@ -2895,7 +2900,7 @@
             <a:fld id="{1D8BD707-D9CF-40AE-B4C6-C98DA3205C09}" type="datetimeFigureOut">
               <a:rPr lang="en-US" smtClean="0"/>
               <a:pPr/>
-              <a:t>5/27/2016</a:t>
+              <a:t>5/28/2016</a:t>
             </a:fld>
             <a:endParaRPr lang="en-US"/>
           </a:p>
@@ -2938,7 +2943,7 @@
             <a:fld id="{B6F15528-21DE-4FAA-801E-634DDDAF4B2B}" type="slidenum">
               <a:rPr lang="en-US" smtClean="0"/>
               <a:pPr/>
-              <a:t>‹#›</a:t>
+              <a:t>‹nr.›</a:t>
             </a:fld>
             <a:endParaRPr lang="en-US"/>
           </a:p>
@@ -3314,7 +3319,7 @@
             <a:fld id="{1D8BD707-D9CF-40AE-B4C6-C98DA3205C09}" type="datetimeFigureOut">
               <a:rPr lang="en-US" smtClean="0"/>
               <a:pPr/>
-              <a:t>5/27/2016</a:t>
+              <a:t>5/28/2016</a:t>
             </a:fld>
             <a:endParaRPr lang="en-US"/>
           </a:p>
@@ -3357,7 +3362,7 @@
             <a:fld id="{B6F15528-21DE-4FAA-801E-634DDDAF4B2B}" type="slidenum">
               <a:rPr lang="en-US" smtClean="0"/>
               <a:pPr/>
-              <a:t>‹#›</a:t>
+              <a:t>‹nr.›</a:t>
             </a:fld>
             <a:endParaRPr lang="en-US"/>
           </a:p>
@@ -3429,7 +3434,7 @@
             <a:fld id="{1D8BD707-D9CF-40AE-B4C6-C98DA3205C09}" type="datetimeFigureOut">
               <a:rPr lang="en-US" smtClean="0"/>
               <a:pPr/>
-              <a:t>5/27/2016</a:t>
+              <a:t>5/28/2016</a:t>
             </a:fld>
             <a:endParaRPr lang="en-US"/>
           </a:p>
@@ -3472,7 +3477,7 @@
             <a:fld id="{B6F15528-21DE-4FAA-801E-634DDDAF4B2B}" type="slidenum">
               <a:rPr lang="en-US" smtClean="0"/>
               <a:pPr/>
-              <a:t>‹#›</a:t>
+              <a:t>‹nr.›</a:t>
             </a:fld>
             <a:endParaRPr lang="en-US"/>
           </a:p>
@@ -3521,7 +3526,7 @@
             <a:fld id="{1D8BD707-D9CF-40AE-B4C6-C98DA3205C09}" type="datetimeFigureOut">
               <a:rPr lang="en-US" smtClean="0"/>
               <a:pPr/>
-              <a:t>5/27/2016</a:t>
+              <a:t>5/28/2016</a:t>
             </a:fld>
             <a:endParaRPr lang="en-US"/>
           </a:p>
@@ -3564,7 +3569,7 @@
             <a:fld id="{B6F15528-21DE-4FAA-801E-634DDDAF4B2B}" type="slidenum">
               <a:rPr lang="en-US" smtClean="0"/>
               <a:pPr/>
-              <a:t>‹#›</a:t>
+              <a:t>‹nr.›</a:t>
             </a:fld>
             <a:endParaRPr lang="en-US"/>
           </a:p>
@@ -3795,7 +3800,7 @@
             <a:fld id="{1D8BD707-D9CF-40AE-B4C6-C98DA3205C09}" type="datetimeFigureOut">
               <a:rPr lang="en-US" smtClean="0"/>
               <a:pPr/>
-              <a:t>5/27/2016</a:t>
+              <a:t>5/28/2016</a:t>
             </a:fld>
             <a:endParaRPr lang="en-US"/>
           </a:p>
@@ -3838,7 +3843,7 @@
             <a:fld id="{B6F15528-21DE-4FAA-801E-634DDDAF4B2B}" type="slidenum">
               <a:rPr lang="en-US" smtClean="0"/>
               <a:pPr/>
-              <a:t>‹#›</a:t>
+              <a:t>‹nr.›</a:t>
             </a:fld>
             <a:endParaRPr lang="en-US"/>
           </a:p>
@@ -4045,7 +4050,7 @@
             <a:fld id="{1D8BD707-D9CF-40AE-B4C6-C98DA3205C09}" type="datetimeFigureOut">
               <a:rPr lang="en-US" smtClean="0"/>
               <a:pPr/>
-              <a:t>5/27/2016</a:t>
+              <a:t>5/28/2016</a:t>
             </a:fld>
             <a:endParaRPr lang="en-US"/>
           </a:p>
@@ -4088,7 +4093,7 @@
             <a:fld id="{B6F15528-21DE-4FAA-801E-634DDDAF4B2B}" type="slidenum">
               <a:rPr lang="en-US" smtClean="0"/>
               <a:pPr/>
-              <a:t>‹#›</a:t>
+              <a:t>‹nr.›</a:t>
             </a:fld>
             <a:endParaRPr lang="en-US"/>
           </a:p>
@@ -4255,7 +4260,7 @@
             <a:fld id="{1D8BD707-D9CF-40AE-B4C6-C98DA3205C09}" type="datetimeFigureOut">
               <a:rPr lang="en-US" smtClean="0"/>
               <a:pPr/>
-              <a:t>5/27/2016</a:t>
+              <a:t>5/28/2016</a:t>
             </a:fld>
             <a:endParaRPr lang="en-US"/>
           </a:p>
@@ -4334,7 +4339,7 @@
             <a:fld id="{B6F15528-21DE-4FAA-801E-634DDDAF4B2B}" type="slidenum">
               <a:rPr lang="en-US" smtClean="0"/>
               <a:pPr/>
-              <a:t>‹#›</a:t>
+              <a:t>‹nr.›</a:t>
             </a:fld>
             <a:endParaRPr lang="en-US"/>
           </a:p>
@@ -5403,7 +5408,7 @@
     </p:spTree>
     <p:extLst>
       <p:ext uri="{BB962C8B-B14F-4D97-AF65-F5344CB8AC3E}">
-        <p14:creationId xmlns:p14="http://schemas.microsoft.com/office/powerpoint/2010/main" xmlns="" val="618514285"/>
+        <p14:creationId xmlns:p14="http://schemas.microsoft.com/office/powerpoint/2010/main" val="618514285"/>
       </p:ext>
     </p:extLst>
   </p:cSld>
@@ -5544,7 +5549,7 @@
     </p:spTree>
     <p:extLst>
       <p:ext uri="{BB962C8B-B14F-4D97-AF65-F5344CB8AC3E}">
-        <p14:creationId xmlns:p14="http://schemas.microsoft.com/office/powerpoint/2010/main" xmlns="" val="4197515640"/>
+        <p14:creationId xmlns:p14="http://schemas.microsoft.com/office/powerpoint/2010/main" val="4197515640"/>
       </p:ext>
     </p:extLst>
   </p:cSld>
@@ -5953,7 +5958,7 @@
     </p:spTree>
     <p:extLst>
       <p:ext uri="{BB962C8B-B14F-4D97-AF65-F5344CB8AC3E}">
-        <p14:creationId xmlns:p14="http://schemas.microsoft.com/office/powerpoint/2010/main" xmlns="" val="3582128535"/>
+        <p14:creationId xmlns:p14="http://schemas.microsoft.com/office/powerpoint/2010/main" val="3582128535"/>
       </p:ext>
     </p:extLst>
   </p:cSld>
@@ -9288,28 +9293,26 @@
       </p:pic>
       <p:pic>
         <p:nvPicPr>
-          <p:cNvPr id="1027" name="Picture 3" descr="C:\Users\Aline\Dropbox\RUG 2015-2016\1.9 Community eclogy research\4. Poster_presentation\Figs and graphs ppt\Step2_Sampled species tree.png"/>
+          <p:cNvPr id="2" name="Afbeelding 1"/>
           <p:cNvPicPr>
-            <a:picLocks noChangeAspect="1" noChangeArrowheads="1"/>
+            <a:picLocks noChangeAspect="1"/>
           </p:cNvPicPr>
           <p:nvPr/>
         </p:nvPicPr>
         <p:blipFill>
-          <a:blip r:embed="rId8" cstate="print"/>
-          <a:srcRect/>
+          <a:blip r:embed="rId8"/>
           <a:stretch>
             <a:fillRect/>
           </a:stretch>
         </p:blipFill>
-        <p:spPr bwMode="auto">
-          <a:xfrm>
-            <a:off x="1219200" y="4724400"/>
-            <a:ext cx="1847850" cy="1295400"/>
+        <p:spPr>
+          <a:xfrm>
+            <a:off x="1162050" y="4744066"/>
+            <a:ext cx="1790700" cy="1304925"/>
           </a:xfrm>
           <a:prstGeom prst="rect">
             <a:avLst/>
           </a:prstGeom>
-          <a:noFill/>
         </p:spPr>
       </p:pic>
     </p:spTree>

</xml_diff>

<commit_message>
is this the /final/ final ppt?
</commit_message>
<xml_diff>
--- a/doc/Cer2016_Femke Thon & Jolien Gay_FINAL.pptx
+++ b/doc/Cer2016_Femke Thon & Jolien Gay_FINAL.pptx
@@ -18,11 +18,11 @@
     <p:sldId id="277" r:id="rId9"/>
     <p:sldId id="290" r:id="rId10"/>
     <p:sldId id="273" r:id="rId11"/>
-    <p:sldId id="294" r:id="rId12"/>
-    <p:sldId id="295" r:id="rId13"/>
-    <p:sldId id="293" r:id="rId14"/>
-    <p:sldId id="297" r:id="rId15"/>
-    <p:sldId id="260" r:id="rId16"/>
+    <p:sldId id="295" r:id="rId12"/>
+    <p:sldId id="294" r:id="rId13"/>
+    <p:sldId id="298" r:id="rId14"/>
+    <p:sldId id="299" r:id="rId15"/>
+    <p:sldId id="300" r:id="rId16"/>
     <p:sldId id="261" r:id="rId17"/>
     <p:sldId id="265" r:id="rId18"/>
   </p:sldIdLst>
@@ -125,7 +125,7 @@
   </p:defaultTextStyle>
   <p:extLst>
     <p:ext uri="{EFAFB233-063F-42B5-8137-9DF3F51BA10A}">
-      <p15:sldGuideLst xmlns:p15="http://schemas.microsoft.com/office/powerpoint/2012/main" xmlns="">
+      <p15:sldGuideLst xmlns:p15="http://schemas.microsoft.com/office/powerpoint/2012/main">
         <p15:guide id="1" orient="horz" pos="2160">
           <p15:clr>
             <a:srgbClr val="A4A3A4"/>
@@ -387,7 +387,7 @@
             <a:fld id="{9BBE7A90-5B18-44E6-896F-B56F6E25EE11}" type="slidenum">
               <a:rPr lang="en-GB" smtClean="0"/>
               <a:pPr/>
-              <a:t>‹#›</a:t>
+              <a:t>‹nr.›</a:t>
             </a:fld>
             <a:endParaRPr lang="en-GB"/>
           </a:p>
@@ -396,7 +396,7 @@
     </p:spTree>
     <p:extLst>
       <p:ext uri="{BB962C8B-B14F-4D97-AF65-F5344CB8AC3E}">
-        <p14:creationId xmlns:p14="http://schemas.microsoft.com/office/powerpoint/2010/main" xmlns="" val="3689852174"/>
+        <p14:creationId xmlns:p14="http://schemas.microsoft.com/office/powerpoint/2010/main" val="3689852174"/>
       </p:ext>
     </p:extLst>
   </p:cSld>
@@ -573,7 +573,7 @@
     </p:spTree>
     <p:extLst>
       <p:ext uri="{BB962C8B-B14F-4D97-AF65-F5344CB8AC3E}">
-        <p14:creationId xmlns:p14="http://schemas.microsoft.com/office/powerpoint/2010/main" xmlns="" val="2596161602"/>
+        <p14:creationId xmlns:p14="http://schemas.microsoft.com/office/powerpoint/2010/main" val="2596161602"/>
       </p:ext>
     </p:extLst>
   </p:cSld>
@@ -660,7 +660,7 @@
     </p:spTree>
     <p:extLst>
       <p:ext uri="{BB962C8B-B14F-4D97-AF65-F5344CB8AC3E}">
-        <p14:creationId xmlns:p14="http://schemas.microsoft.com/office/powerpoint/2010/main" xmlns="" val="4122720026"/>
+        <p14:creationId xmlns:p14="http://schemas.microsoft.com/office/powerpoint/2010/main" val="4122720026"/>
       </p:ext>
     </p:extLst>
   </p:cSld>
@@ -747,7 +747,7 @@
     </p:spTree>
     <p:extLst>
       <p:ext uri="{BB962C8B-B14F-4D97-AF65-F5344CB8AC3E}">
-        <p14:creationId xmlns:p14="http://schemas.microsoft.com/office/powerpoint/2010/main" xmlns="" val="958227800"/>
+        <p14:creationId xmlns:p14="http://schemas.microsoft.com/office/powerpoint/2010/main" val="958227800"/>
       </p:ext>
     </p:extLst>
   </p:cSld>
@@ -838,7 +838,7 @@
     </p:spTree>
     <p:extLst>
       <p:ext uri="{BB962C8B-B14F-4D97-AF65-F5344CB8AC3E}">
-        <p14:creationId xmlns:p14="http://schemas.microsoft.com/office/powerpoint/2010/main" xmlns="" val="3137112786"/>
+        <p14:creationId xmlns:p14="http://schemas.microsoft.com/office/powerpoint/2010/main" val="3137112786"/>
       </p:ext>
     </p:extLst>
   </p:cSld>
@@ -997,7 +997,7 @@
     </p:spTree>
     <p:extLst>
       <p:ext uri="{BB962C8B-B14F-4D97-AF65-F5344CB8AC3E}">
-        <p14:creationId xmlns:p14="http://schemas.microsoft.com/office/powerpoint/2010/main" xmlns="" val="11305336"/>
+        <p14:creationId xmlns:p14="http://schemas.microsoft.com/office/powerpoint/2010/main" val="11305336"/>
       </p:ext>
     </p:extLst>
   </p:cSld>
@@ -1084,7 +1084,7 @@
     </p:spTree>
     <p:extLst>
       <p:ext uri="{BB962C8B-B14F-4D97-AF65-F5344CB8AC3E}">
-        <p14:creationId xmlns:p14="http://schemas.microsoft.com/office/powerpoint/2010/main" xmlns="" val="1553940335"/>
+        <p14:creationId xmlns:p14="http://schemas.microsoft.com/office/powerpoint/2010/main" val="1553940335"/>
       </p:ext>
     </p:extLst>
   </p:cSld>
@@ -1227,7 +1227,7 @@
     </p:spTree>
     <p:extLst>
       <p:ext uri="{BB962C8B-B14F-4D97-AF65-F5344CB8AC3E}">
-        <p14:creationId xmlns:p14="http://schemas.microsoft.com/office/powerpoint/2010/main" xmlns="" val="2660152302"/>
+        <p14:creationId xmlns:p14="http://schemas.microsoft.com/office/powerpoint/2010/main" val="2660152302"/>
       </p:ext>
     </p:extLst>
   </p:cSld>
@@ -1473,7 +1473,7 @@
     </p:spTree>
     <p:extLst>
       <p:ext uri="{BB962C8B-B14F-4D97-AF65-F5344CB8AC3E}">
-        <p14:creationId xmlns:p14="http://schemas.microsoft.com/office/powerpoint/2010/main" xmlns="" val="2545523758"/>
+        <p14:creationId xmlns:p14="http://schemas.microsoft.com/office/powerpoint/2010/main" val="2545523758"/>
       </p:ext>
     </p:extLst>
   </p:cSld>
@@ -1560,7 +1560,7 @@
     </p:spTree>
     <p:extLst>
       <p:ext uri="{BB962C8B-B14F-4D97-AF65-F5344CB8AC3E}">
-        <p14:creationId xmlns:p14="http://schemas.microsoft.com/office/powerpoint/2010/main" xmlns="" val="3248569269"/>
+        <p14:creationId xmlns:p14="http://schemas.microsoft.com/office/powerpoint/2010/main" val="3248569269"/>
       </p:ext>
     </p:extLst>
   </p:cSld>
@@ -1669,7 +1669,7 @@
     </p:spTree>
     <p:extLst>
       <p:ext uri="{BB962C8B-B14F-4D97-AF65-F5344CB8AC3E}">
-        <p14:creationId xmlns:p14="http://schemas.microsoft.com/office/powerpoint/2010/main" xmlns="" val="3544749578"/>
+        <p14:creationId xmlns:p14="http://schemas.microsoft.com/office/powerpoint/2010/main" val="3544749578"/>
       </p:ext>
     </p:extLst>
   </p:cSld>
@@ -1904,7 +1904,7 @@
             <a:fld id="{B6F15528-21DE-4FAA-801E-634DDDAF4B2B}" type="slidenum">
               <a:rPr lang="en-US" smtClean="0"/>
               <a:pPr/>
-              <a:t>‹#›</a:t>
+              <a:t>‹nr.›</a:t>
             </a:fld>
             <a:endParaRPr lang="en-US"/>
           </a:p>
@@ -2071,7 +2071,7 @@
             <a:fld id="{B6F15528-21DE-4FAA-801E-634DDDAF4B2B}" type="slidenum">
               <a:rPr lang="en-US" smtClean="0"/>
               <a:pPr/>
-              <a:t>‹#›</a:t>
+              <a:t>‹nr.›</a:t>
             </a:fld>
             <a:endParaRPr lang="en-US"/>
           </a:p>
@@ -2248,7 +2248,7 @@
             <a:fld id="{B6F15528-21DE-4FAA-801E-634DDDAF4B2B}" type="slidenum">
               <a:rPr lang="en-US" smtClean="0"/>
               <a:pPr/>
-              <a:t>‹#›</a:t>
+              <a:t>‹nr.›</a:t>
             </a:fld>
             <a:endParaRPr lang="en-US"/>
           </a:p>
@@ -2415,7 +2415,7 @@
             <a:fld id="{B6F15528-21DE-4FAA-801E-634DDDAF4B2B}" type="slidenum">
               <a:rPr lang="en-US" smtClean="0"/>
               <a:pPr/>
-              <a:t>‹#›</a:t>
+              <a:t>‹nr.›</a:t>
             </a:fld>
             <a:endParaRPr lang="en-US"/>
           </a:p>
@@ -2658,7 +2658,7 @@
             <a:fld id="{B6F15528-21DE-4FAA-801E-634DDDAF4B2B}" type="slidenum">
               <a:rPr lang="en-US" smtClean="0"/>
               <a:pPr/>
-              <a:t>‹#›</a:t>
+              <a:t>‹nr.›</a:t>
             </a:fld>
             <a:endParaRPr lang="en-US"/>
           </a:p>
@@ -2943,7 +2943,7 @@
             <a:fld id="{B6F15528-21DE-4FAA-801E-634DDDAF4B2B}" type="slidenum">
               <a:rPr lang="en-US" smtClean="0"/>
               <a:pPr/>
-              <a:t>‹#›</a:t>
+              <a:t>‹nr.›</a:t>
             </a:fld>
             <a:endParaRPr lang="en-US"/>
           </a:p>
@@ -3362,7 +3362,7 @@
             <a:fld id="{B6F15528-21DE-4FAA-801E-634DDDAF4B2B}" type="slidenum">
               <a:rPr lang="en-US" smtClean="0"/>
               <a:pPr/>
-              <a:t>‹#›</a:t>
+              <a:t>‹nr.›</a:t>
             </a:fld>
             <a:endParaRPr lang="en-US"/>
           </a:p>
@@ -3477,7 +3477,7 @@
             <a:fld id="{B6F15528-21DE-4FAA-801E-634DDDAF4B2B}" type="slidenum">
               <a:rPr lang="en-US" smtClean="0"/>
               <a:pPr/>
-              <a:t>‹#›</a:t>
+              <a:t>‹nr.›</a:t>
             </a:fld>
             <a:endParaRPr lang="en-US"/>
           </a:p>
@@ -3569,7 +3569,7 @@
             <a:fld id="{B6F15528-21DE-4FAA-801E-634DDDAF4B2B}" type="slidenum">
               <a:rPr lang="en-US" smtClean="0"/>
               <a:pPr/>
-              <a:t>‹#›</a:t>
+              <a:t>‹nr.›</a:t>
             </a:fld>
             <a:endParaRPr lang="en-US"/>
           </a:p>
@@ -3843,7 +3843,7 @@
             <a:fld id="{B6F15528-21DE-4FAA-801E-634DDDAF4B2B}" type="slidenum">
               <a:rPr lang="en-US" smtClean="0"/>
               <a:pPr/>
-              <a:t>‹#›</a:t>
+              <a:t>‹nr.›</a:t>
             </a:fld>
             <a:endParaRPr lang="en-US"/>
           </a:p>
@@ -4093,7 +4093,7 @@
             <a:fld id="{B6F15528-21DE-4FAA-801E-634DDDAF4B2B}" type="slidenum">
               <a:rPr lang="en-US" smtClean="0"/>
               <a:pPr/>
-              <a:t>‹#›</a:t>
+              <a:t>‹nr.›</a:t>
             </a:fld>
             <a:endParaRPr lang="en-US"/>
           </a:p>
@@ -4339,7 +4339,7 @@
             <a:fld id="{B6F15528-21DE-4FAA-801E-634DDDAF4B2B}" type="slidenum">
               <a:rPr lang="en-US" smtClean="0"/>
               <a:pPr/>
-              <a:t>‹#›</a:t>
+              <a:t>‹nr.›</a:t>
             </a:fld>
             <a:endParaRPr lang="en-US"/>
           </a:p>
@@ -5303,11 +5303,13 @@
       </p:sp>
       <p:pic>
         <p:nvPicPr>
-          <p:cNvPr id="8" name="Picture 2" descr="C:\Users\Aline\Dropbox\RUG 2015-2016\1.9 Community eclogy research\4. Poster_presentation\Figs and graphs ppt\Number of runs for Speciation Initiation Rate (SIR).png"/>
+          <p:cNvPr id="8" name="Picture 2" descr="C:\Users\Aline\Dropbox\RUG 2015-2016\1.9 Community eclogy research\4. Poster_presentation\Figs and graphs ppt\Sampled Trees Gamma Statistics.png"/>
           <p:cNvPicPr>
-            <a:picLocks noChangeAspect="1" noChangeArrowheads="1"/>
+            <a:picLocks noGrp="1" noChangeAspect="1" noChangeArrowheads="1"/>
           </p:cNvPicPr>
-          <p:nvPr/>
+          <p:nvPr>
+            <p:ph idx="1"/>
+          </p:nvPr>
         </p:nvPicPr>
         <p:blipFill>
           <a:blip r:embed="rId3" cstate="print"/>
@@ -5318,8 +5320,8 @@
         </p:blipFill>
         <p:spPr bwMode="auto">
           <a:xfrm>
-            <a:off x="1904999" y="1177957"/>
-            <a:ext cx="5334000" cy="2959861"/>
+            <a:off x="1905000" y="1163664"/>
+            <a:ext cx="5079579" cy="2819400"/>
           </a:xfrm>
           <a:prstGeom prst="rect">
             <a:avLst/>
@@ -5329,13 +5331,11 @@
       </p:pic>
       <p:pic>
         <p:nvPicPr>
-          <p:cNvPr id="9" name="Picture 3" descr="C:\Users\Aline\Dropbox\RUG 2015-2016\1.9 Community eclogy research\4. Poster_presentation\Figs and graphs ppt\Differences Gammas.png"/>
+          <p:cNvPr id="9" name="Picture 3" descr="C:\Users\Aline\Dropbox\RUG 2015-2016\1.9 Community eclogy research\4. Poster_presentation\Figs and graphs ppt\Posterior Trees Gamma Statistics.png"/>
           <p:cNvPicPr>
-            <a:picLocks noGrp="1" noChangeAspect="1" noChangeArrowheads="1"/>
+            <a:picLocks noChangeAspect="1" noChangeArrowheads="1"/>
           </p:cNvPicPr>
-          <p:nvPr>
-            <p:ph idx="1"/>
-          </p:nvPr>
+          <p:nvPr/>
         </p:nvPicPr>
         <p:blipFill>
           <a:blip r:embed="rId4" cstate="print"/>
@@ -5346,8 +5346,8 @@
         </p:blipFill>
         <p:spPr bwMode="auto">
           <a:xfrm>
-            <a:off x="1904999" y="3967715"/>
-            <a:ext cx="5334000" cy="2960615"/>
+            <a:off x="1905000" y="3940444"/>
+            <a:ext cx="5079579" cy="2818682"/>
           </a:xfrm>
           <a:prstGeom prst="rect">
             <a:avLst/>
@@ -5355,66 +5355,23 @@
           <a:noFill/>
         </p:spPr>
       </p:pic>
-      <p:sp>
-        <p:nvSpPr>
-          <p:cNvPr id="3" name="Vermenigvuldigen 2">
-            <a:hlinkClick r:id="" action="ppaction://noaction" highlightClick="1"/>
-          </p:cNvPr>
-          <p:cNvSpPr/>
-          <p:nvPr/>
-        </p:nvSpPr>
-        <p:spPr>
-          <a:xfrm>
-            <a:off x="3962400" y="5611562"/>
-            <a:ext cx="838200" cy="914400"/>
-          </a:xfrm>
-          <a:prstGeom prst="mathMultiply">
-            <a:avLst/>
-          </a:prstGeom>
-          <a:solidFill>
-            <a:srgbClr val="FF0000"/>
-          </a:solidFill>
-          <a:ln>
-            <a:solidFill>
-              <a:srgbClr val="FF0000"/>
-            </a:solidFill>
-          </a:ln>
-        </p:spPr>
-        <p:style>
-          <a:lnRef idx="2">
-            <a:schemeClr val="accent1">
-              <a:shade val="50000"/>
-            </a:schemeClr>
-          </a:lnRef>
-          <a:fillRef idx="1">
-            <a:schemeClr val="accent1"/>
-          </a:fillRef>
-          <a:effectRef idx="0">
-            <a:schemeClr val="accent1"/>
-          </a:effectRef>
-          <a:fontRef idx="minor">
-            <a:schemeClr val="lt1"/>
-          </a:fontRef>
-        </p:style>
-        <p:txBody>
-          <a:bodyPr rtlCol="0" anchor="ctr"/>
-          <a:lstStyle/>
-          <a:p>
-            <a:pPr algn="ctr"/>
-            <a:endParaRPr lang="en-GB"/>
-          </a:p>
-        </p:txBody>
-      </p:sp>
     </p:spTree>
     <p:extLst>
       <p:ext uri="{BB962C8B-B14F-4D97-AF65-F5344CB8AC3E}">
-        <p14:creationId xmlns:p14="http://schemas.microsoft.com/office/powerpoint/2010/main" xmlns="" val="618514285"/>
+        <p14:creationId xmlns:p14="http://schemas.microsoft.com/office/powerpoint/2010/main" val="4197515640"/>
       </p:ext>
     </p:extLst>
   </p:cSld>
   <p:clrMapOvr>
     <a:masterClrMapping/>
   </p:clrMapOvr>
+  <p:timing>
+    <p:tnLst>
+      <p:par>
+        <p:cTn id="1" dur="indefinite" restart="never" nodeType="tmRoot"/>
+      </p:par>
+    </p:tnLst>
+  </p:timing>
 </p:sld>
 </file>
 
@@ -5494,13 +5451,11 @@
       </p:sp>
       <p:pic>
         <p:nvPicPr>
-          <p:cNvPr id="8" name="Picture 2" descr="C:\Users\Aline\Dropbox\RUG 2015-2016\1.9 Community eclogy research\4. Poster_presentation\Figs and graphs ppt\Sampled Trees Gamma Statistics.png"/>
+          <p:cNvPr id="8" name="Picture 2" descr="C:\Users\Aline\Dropbox\RUG 2015-2016\1.9 Community eclogy research\4. Poster_presentation\Figs and graphs ppt\Number of runs for Speciation Initiation Rate (SIR).png"/>
           <p:cNvPicPr>
-            <a:picLocks noGrp="1" noChangeAspect="1" noChangeArrowheads="1"/>
+            <a:picLocks noChangeAspect="1" noChangeArrowheads="1"/>
           </p:cNvPicPr>
-          <p:nvPr>
-            <p:ph idx="1"/>
-          </p:nvPr>
+          <p:nvPr/>
         </p:nvPicPr>
         <p:blipFill>
           <a:blip r:embed="rId3" cstate="print"/>
@@ -5511,8 +5466,8 @@
         </p:blipFill>
         <p:spPr bwMode="auto">
           <a:xfrm>
-            <a:off x="1905000" y="1163664"/>
-            <a:ext cx="5079579" cy="2819400"/>
+            <a:off x="685800" y="1338857"/>
+            <a:ext cx="5967116" cy="3311180"/>
           </a:xfrm>
           <a:prstGeom prst="rect">
             <a:avLst/>
@@ -5522,40 +5477,91 @@
       </p:pic>
       <p:pic>
         <p:nvPicPr>
-          <p:cNvPr id="9" name="Picture 3" descr="C:\Users\Aline\Dropbox\RUG 2015-2016\1.9 Community eclogy research\4. Poster_presentation\Figs and graphs ppt\Posterior Trees Gamma Statistics.png"/>
+          <p:cNvPr id="7" name="Afbeelding 6"/>
           <p:cNvPicPr>
-            <a:picLocks noChangeAspect="1" noChangeArrowheads="1"/>
+            <a:picLocks noChangeAspect="1"/>
           </p:cNvPicPr>
           <p:nvPr/>
         </p:nvPicPr>
         <p:blipFill>
           <a:blip r:embed="rId4" cstate="print"/>
-          <a:srcRect/>
           <a:stretch>
             <a:fillRect/>
           </a:stretch>
         </p:blipFill>
-        <p:spPr bwMode="auto">
-          <a:xfrm>
-            <a:off x="1905000" y="3940444"/>
-            <a:ext cx="5079579" cy="2818682"/>
+        <p:spPr>
+          <a:xfrm>
+            <a:off x="5712327" y="4650037"/>
+            <a:ext cx="2974473" cy="1632012"/>
+          </a:xfrm>
+          <a:prstGeom prst="rect">
+            <a:avLst/>
+          </a:prstGeom>
+        </p:spPr>
+      </p:pic>
+      <p:sp>
+        <p:nvSpPr>
+          <p:cNvPr id="5" name="Rechthoek 4"/>
+          <p:cNvSpPr/>
+          <p:nvPr/>
+        </p:nvSpPr>
+        <p:spPr>
+          <a:xfrm>
+            <a:off x="5712327" y="4876800"/>
+            <a:ext cx="457200" cy="381000"/>
           </a:xfrm>
           <a:prstGeom prst="rect">
             <a:avLst/>
           </a:prstGeom>
           <a:noFill/>
-        </p:spPr>
-      </p:pic>
+          <a:ln>
+            <a:solidFill>
+              <a:srgbClr val="FF0000"/>
+            </a:solidFill>
+          </a:ln>
+        </p:spPr>
+        <p:style>
+          <a:lnRef idx="2">
+            <a:schemeClr val="accent1">
+              <a:shade val="50000"/>
+            </a:schemeClr>
+          </a:lnRef>
+          <a:fillRef idx="1">
+            <a:schemeClr val="accent1"/>
+          </a:fillRef>
+          <a:effectRef idx="0">
+            <a:schemeClr val="accent1"/>
+          </a:effectRef>
+          <a:fontRef idx="minor">
+            <a:schemeClr val="lt1"/>
+          </a:fontRef>
+        </p:style>
+        <p:txBody>
+          <a:bodyPr rtlCol="0" anchor="ctr"/>
+          <a:lstStyle/>
+          <a:p>
+            <a:pPr algn="ctr"/>
+            <a:endParaRPr lang="en-GB"/>
+          </a:p>
+        </p:txBody>
+      </p:sp>
     </p:spTree>
     <p:extLst>
       <p:ext uri="{BB962C8B-B14F-4D97-AF65-F5344CB8AC3E}">
-        <p14:creationId xmlns:p14="http://schemas.microsoft.com/office/powerpoint/2010/main" xmlns="" val="4197515640"/>
+        <p14:creationId xmlns:p14="http://schemas.microsoft.com/office/powerpoint/2010/main" val="618514285"/>
       </p:ext>
     </p:extLst>
   </p:cSld>
   <p:clrMapOvr>
     <a:masterClrMapping/>
   </p:clrMapOvr>
+  <p:timing>
+    <p:tnLst>
+      <p:par>
+        <p:cTn id="1" dur="indefinite" restart="never" nodeType="tmRoot"/>
+      </p:par>
+    </p:tnLst>
+  </p:timing>
 </p:sld>
 </file>
 
@@ -5635,54 +5641,115 @@
           </a:p>
         </p:txBody>
       </p:sp>
-      <p:sp>
-        <p:nvSpPr>
-          <p:cNvPr id="6" name="Tijdelijke aanduiding voor inhoud 5"/>
-          <p:cNvSpPr>
-            <a:spLocks noGrp="1"/>
-          </p:cNvSpPr>
-          <p:nvPr>
-            <p:ph idx="1"/>
-          </p:nvPr>
-        </p:nvSpPr>
-        <p:spPr/>
-        <p:txBody>
-          <a:bodyPr/>
-          <a:lstStyle/>
-          <a:p>
-            <a:endParaRPr lang="en-GB"/>
-          </a:p>
-        </p:txBody>
-      </p:sp>
       <p:pic>
         <p:nvPicPr>
-          <p:cNvPr id="7" name="Afbeelding 6"/>
+          <p:cNvPr id="3" name="Tijdelijke aanduiding voor inhoud 2"/>
           <p:cNvPicPr>
-            <a:picLocks noChangeAspect="1"/>
+            <a:picLocks noGrp="1" noChangeAspect="1"/>
           </p:cNvPicPr>
-          <p:nvPr/>
+          <p:nvPr>
+            <p:ph idx="1"/>
+          </p:nvPr>
         </p:nvPicPr>
         <p:blipFill>
-          <a:blip r:embed="rId3" cstate="print"/>
+          <a:blip r:embed="rId3">
+            <a:extLst>
+              <a:ext uri="{28A0092B-C50C-407E-A947-70E740481C1C}">
+                <a14:useLocalDpi xmlns:a14="http://schemas.microsoft.com/office/drawing/2010/main" val="0"/>
+              </a:ext>
+            </a:extLst>
+          </a:blip>
           <a:stretch>
             <a:fillRect/>
           </a:stretch>
         </p:blipFill>
         <p:spPr>
           <a:xfrm>
-            <a:off x="457200" y="2280444"/>
-            <a:ext cx="8282990" cy="3165474"/>
-          </a:xfrm>
-          <a:prstGeom prst="rect">
+            <a:off x="1090697" y="1307249"/>
+            <a:ext cx="7596103" cy="4616757"/>
+          </a:xfrm>
+        </p:spPr>
+      </p:pic>
+      <p:cxnSp>
+        <p:nvCxnSpPr>
+          <p:cNvPr id="6" name="Rechte verbindingslijn 5"/>
+          <p:cNvCxnSpPr/>
+          <p:nvPr/>
+        </p:nvCxnSpPr>
+        <p:spPr>
+          <a:xfrm>
+            <a:off x="914400" y="1295400"/>
+            <a:ext cx="0" cy="1600200"/>
+          </a:xfrm>
+          <a:prstGeom prst="line">
             <a:avLst/>
           </a:prstGeom>
-        </p:spPr>
-      </p:pic>
+          <a:ln>
+            <a:prstDash val="dashDot"/>
+          </a:ln>
+        </p:spPr>
+        <p:style>
+          <a:lnRef idx="1">
+            <a:schemeClr val="dk1"/>
+          </a:lnRef>
+          <a:fillRef idx="0">
+            <a:schemeClr val="dk1"/>
+          </a:fillRef>
+          <a:effectRef idx="0">
+            <a:schemeClr val="dk1"/>
+          </a:effectRef>
+          <a:fontRef idx="minor">
+            <a:schemeClr val="tx1"/>
+          </a:fontRef>
+        </p:style>
+      </p:cxnSp>
+      <p:cxnSp>
+        <p:nvCxnSpPr>
+          <p:cNvPr id="9" name="Rechte verbindingslijn 8"/>
+          <p:cNvCxnSpPr/>
+          <p:nvPr/>
+        </p:nvCxnSpPr>
+        <p:spPr>
+          <a:xfrm>
+            <a:off x="914400" y="2895600"/>
+            <a:ext cx="0" cy="2819400"/>
+          </a:xfrm>
+          <a:prstGeom prst="line">
+            <a:avLst/>
+          </a:prstGeom>
+        </p:spPr>
+        <p:style>
+          <a:lnRef idx="1">
+            <a:schemeClr val="dk1"/>
+          </a:lnRef>
+          <a:fillRef idx="0">
+            <a:schemeClr val="dk1"/>
+          </a:fillRef>
+          <a:effectRef idx="0">
+            <a:schemeClr val="dk1"/>
+          </a:effectRef>
+          <a:fontRef idx="minor">
+            <a:schemeClr val="tx1"/>
+          </a:fontRef>
+        </p:style>
+      </p:cxnSp>
     </p:spTree>
+    <p:extLst>
+      <p:ext uri="{BB962C8B-B14F-4D97-AF65-F5344CB8AC3E}">
+        <p14:creationId xmlns:p14="http://schemas.microsoft.com/office/powerpoint/2010/main" val="3832980917"/>
+      </p:ext>
+    </p:extLst>
   </p:cSld>
   <p:clrMapOvr>
     <a:masterClrMapping/>
   </p:clrMapOvr>
+  <p:timing>
+    <p:tnLst>
+      <p:par>
+        <p:cTn id="1" dur="indefinite" restart="never" nodeType="tmRoot"/>
+      </p:par>
+    </p:tnLst>
+  </p:timing>
 </p:sld>
 </file>
 
@@ -5729,25 +5796,35 @@
           <a:noFill/>
         </p:spPr>
       </p:pic>
-      <p:sp>
-        <p:nvSpPr>
-          <p:cNvPr id="6" name="Tijdelijke aanduiding voor inhoud 5"/>
-          <p:cNvSpPr>
-            <a:spLocks noGrp="1"/>
-          </p:cNvSpPr>
+      <p:pic>
+        <p:nvPicPr>
+          <p:cNvPr id="2" name="Tijdelijke aanduiding voor inhoud 1"/>
+          <p:cNvPicPr>
+            <a:picLocks noGrp="1" noChangeAspect="1"/>
+          </p:cNvPicPr>
           <p:nvPr>
             <p:ph idx="1"/>
           </p:nvPr>
-        </p:nvSpPr>
-        <p:spPr/>
-        <p:txBody>
-          <a:bodyPr/>
-          <a:lstStyle/>
-          <a:p>
-            <a:endParaRPr lang="en-GB"/>
-          </a:p>
-        </p:txBody>
-      </p:sp>
+        </p:nvPicPr>
+        <p:blipFill>
+          <a:blip r:embed="rId3">
+            <a:extLst>
+              <a:ext uri="{28A0092B-C50C-407E-A947-70E740481C1C}">
+                <a14:useLocalDpi xmlns:a14="http://schemas.microsoft.com/office/drawing/2010/main" val="0"/>
+              </a:ext>
+            </a:extLst>
+          </a:blip>
+          <a:stretch>
+            <a:fillRect/>
+          </a:stretch>
+        </p:blipFill>
+        <p:spPr>
+          <a:xfrm>
+            <a:off x="1633127" y="2076994"/>
+            <a:ext cx="5877745" cy="3572374"/>
+          </a:xfrm>
+        </p:spPr>
+      </p:pic>
       <p:sp>
         <p:nvSpPr>
           <p:cNvPr id="3" name="Titel 2"/>
@@ -5845,126 +5922,51 @@
       </p:sp>
       <p:pic>
         <p:nvPicPr>
-          <p:cNvPr id="10" name="Picture 2" descr="C:\Users\Aline\Dropbox\RUG 2015-2016\1.9 Community eclogy research\4. Poster_presentation\Figs and graphs ppt\Mutation rate big diff.png"/>
+          <p:cNvPr id="7" name="Afbeelding 6"/>
           <p:cNvPicPr>
-            <a:picLocks noChangeAspect="1" noChangeArrowheads="1"/>
+            <a:picLocks noChangeAspect="1"/>
           </p:cNvPicPr>
           <p:nvPr/>
         </p:nvPicPr>
         <p:blipFill>
-          <a:blip r:embed="rId3" cstate="print"/>
-          <a:srcRect/>
+          <a:blip r:embed="rId4">
+            <a:extLst>
+              <a:ext uri="{28A0092B-C50C-407E-A947-70E740481C1C}">
+                <a14:useLocalDpi xmlns:a14="http://schemas.microsoft.com/office/drawing/2010/main" val="0"/>
+              </a:ext>
+            </a:extLst>
+          </a:blip>
           <a:stretch>
             <a:fillRect/>
           </a:stretch>
         </p:blipFill>
-        <p:spPr bwMode="auto">
-          <a:xfrm>
-            <a:off x="2362200" y="1219200"/>
-            <a:ext cx="4381504" cy="2431316"/>
+        <p:spPr>
+          <a:xfrm>
+            <a:off x="996011" y="1428524"/>
+            <a:ext cx="7151975" cy="4346825"/>
           </a:xfrm>
           <a:prstGeom prst="rect">
             <a:avLst/>
           </a:prstGeom>
-          <a:noFill/>
         </p:spPr>
       </p:pic>
-      <p:pic>
-        <p:nvPicPr>
-          <p:cNvPr id="11" name="Picture 3" descr="C:\Users\Aline\Dropbox\RUG 2015-2016\1.9 Community eclogy research\4. Poster_presentation\Figs and graphs ppt\mutation rate small diff.png"/>
-          <p:cNvPicPr>
-            <a:picLocks noChangeAspect="1" noChangeArrowheads="1"/>
-          </p:cNvPicPr>
-          <p:nvPr/>
-        </p:nvPicPr>
-        <p:blipFill>
-          <a:blip r:embed="rId4" cstate="print"/>
-          <a:srcRect/>
-          <a:stretch>
-            <a:fillRect/>
-          </a:stretch>
-        </p:blipFill>
-        <p:spPr bwMode="auto">
-          <a:xfrm>
-            <a:off x="2362200" y="3886200"/>
-            <a:ext cx="4419600" cy="2452456"/>
-          </a:xfrm>
-          <a:prstGeom prst="rect">
-            <a:avLst/>
-          </a:prstGeom>
-          <a:noFill/>
-        </p:spPr>
-      </p:pic>
-      <p:sp>
-        <p:nvSpPr>
-          <p:cNvPr id="12" name="TextBox 5"/>
-          <p:cNvSpPr txBox="1"/>
-          <p:nvPr/>
-        </p:nvSpPr>
-        <p:spPr>
-          <a:xfrm>
-            <a:off x="990600" y="1981200"/>
-            <a:ext cx="1371600" cy="646331"/>
-          </a:xfrm>
-          <a:prstGeom prst="rect">
-            <a:avLst/>
-          </a:prstGeom>
-          <a:noFill/>
-        </p:spPr>
-        <p:txBody>
-          <a:bodyPr wrap="square" rtlCol="0">
-            <a:spAutoFit/>
-          </a:bodyPr>
-          <a:lstStyle/>
-          <a:p>
-            <a:r>
-              <a:rPr lang="nl-NL" dirty="0" smtClean="0"/>
-              <a:t>Big difference</a:t>
-            </a:r>
-            <a:endParaRPr lang="en-GB" dirty="0"/>
-          </a:p>
-        </p:txBody>
-      </p:sp>
-      <p:sp>
-        <p:nvSpPr>
-          <p:cNvPr id="13" name="TextBox 6"/>
-          <p:cNvSpPr txBox="1"/>
-          <p:nvPr/>
-        </p:nvSpPr>
-        <p:spPr>
-          <a:xfrm>
-            <a:off x="990600" y="4648200"/>
-            <a:ext cx="1371600" cy="646331"/>
-          </a:xfrm>
-          <a:prstGeom prst="rect">
-            <a:avLst/>
-          </a:prstGeom>
-          <a:noFill/>
-        </p:spPr>
-        <p:txBody>
-          <a:bodyPr wrap="square" rtlCol="0">
-            <a:spAutoFit/>
-          </a:bodyPr>
-          <a:lstStyle/>
-          <a:p>
-            <a:r>
-              <a:rPr lang="nl-NL" dirty="0" smtClean="0"/>
-              <a:t>Small difference</a:t>
-            </a:r>
-            <a:endParaRPr lang="en-GB" dirty="0"/>
-          </a:p>
-        </p:txBody>
-      </p:sp>
     </p:spTree>
     <p:extLst>
       <p:ext uri="{BB962C8B-B14F-4D97-AF65-F5344CB8AC3E}">
-        <p14:creationId xmlns:p14="http://schemas.microsoft.com/office/powerpoint/2010/main" xmlns="" val="3582128535"/>
+        <p14:creationId xmlns:p14="http://schemas.microsoft.com/office/powerpoint/2010/main" val="1986217964"/>
       </p:ext>
     </p:extLst>
   </p:cSld>
   <p:clrMapOvr>
     <a:masterClrMapping/>
   </p:clrMapOvr>
+  <p:timing>
+    <p:tnLst>
+      <p:par>
+        <p:cTn id="1" dur="indefinite" restart="never" nodeType="tmRoot"/>
+      </p:par>
+    </p:tnLst>
+  </p:timing>
 </p:sld>
 </file>
 
@@ -6021,7 +6023,12 @@
             <p:ph type="title"/>
           </p:nvPr>
         </p:nvSpPr>
-        <p:spPr/>
+        <p:spPr>
+          <a:xfrm>
+            <a:off x="473529" y="296863"/>
+            <a:ext cx="8229600" cy="1143000"/>
+          </a:xfrm>
+        </p:spPr>
         <p:txBody>
           <a:bodyPr/>
           <a:lstStyle/>
@@ -6052,31 +6059,116 @@
           <a:lstStyle/>
           <a:p>
             <a:pPr>
-              <a:buNone/>
+              <a:buFontTx/>
+              <a:buChar char="-"/>
             </a:pPr>
             <a:r>
               <a:rPr lang="en-GB" sz="2800" dirty="0" smtClean="0"/>
-              <a:t>Error gamma statistics: not </a:t>
-            </a:r>
-            <a:r>
-              <a:rPr lang="en-GB" sz="2800" smtClean="0"/>
-              <a:t>substantial.</a:t>
-            </a:r>
-            <a:endParaRPr lang="en-GB" sz="2800" dirty="0" smtClean="0"/>
-          </a:p>
-          <a:p>
-            <a:pPr lvl="1">
-              <a:buNone/>
+              <a:t>Beast recovers the trees well.</a:t>
+            </a:r>
+          </a:p>
+          <a:p>
+            <a:pPr>
+              <a:buFontTx/>
+              <a:buChar char="-"/>
             </a:pPr>
-            <a:endParaRPr lang="nl-NL" sz="2400" dirty="0" smtClean="0"/>
-          </a:p>
-          <a:p>
-            <a:pPr lvl="1"/>
+            <a:r>
+              <a:rPr lang="en-GB" sz="2800" dirty="0" smtClean="0"/>
+              <a:t>No pressing need to include PBD in BEAST2. </a:t>
+            </a:r>
+          </a:p>
+          <a:p>
+            <a:pPr>
+              <a:buFontTx/>
+              <a:buChar char="-"/>
+            </a:pPr>
             <a:endParaRPr lang="en-GB" sz="2400" dirty="0" smtClean="0"/>
           </a:p>
+          <a:p>
+            <a:pPr>
+              <a:buFontTx/>
+              <a:buChar char="-"/>
+            </a:pPr>
+            <a:endParaRPr lang="en-GB" sz="2400" dirty="0"/>
+          </a:p>
+          <a:p>
+            <a:pPr>
+              <a:buFontTx/>
+              <a:buChar char="-"/>
+            </a:pPr>
+            <a:endParaRPr lang="en-GB" sz="2400" dirty="0" smtClean="0"/>
+          </a:p>
+          <a:p>
+            <a:pPr>
+              <a:buFontTx/>
+              <a:buChar char="-"/>
+            </a:pPr>
+            <a:endParaRPr lang="en-GB" sz="2400" dirty="0"/>
+          </a:p>
+          <a:p>
+            <a:pPr>
+              <a:buFontTx/>
+              <a:buChar char="-"/>
+            </a:pPr>
+            <a:r>
+              <a:rPr lang="en-GB" sz="2800" dirty="0" smtClean="0"/>
+              <a:t>Other statistics (NLTT, NRBS) should be examined.</a:t>
+            </a:r>
+          </a:p>
+        </p:txBody>
+      </p:sp>
+      <p:sp>
+        <p:nvSpPr>
+          <p:cNvPr id="5" name="Title 1"/>
+          <p:cNvSpPr txBox="1">
+            <a:spLocks/>
+          </p:cNvSpPr>
+          <p:nvPr/>
+        </p:nvSpPr>
+        <p:spPr>
+          <a:xfrm>
+            <a:off x="457200" y="3078163"/>
+            <a:ext cx="8229600" cy="1143000"/>
+          </a:xfrm>
+          <a:prstGeom prst="rect">
+            <a:avLst/>
+          </a:prstGeom>
+        </p:spPr>
+        <p:txBody>
+          <a:bodyPr vert="horz" lIns="91440" tIns="45720" rIns="91440" bIns="45720" rtlCol="0" anchor="ctr">
+            <a:normAutofit/>
+          </a:bodyPr>
+          <a:lstStyle>
+            <a:lvl1pPr algn="ctr" defTabSz="914400" rtl="0" eaLnBrk="1" latinLnBrk="0" hangingPunct="1">
+              <a:spcBef>
+                <a:spcPct val="0"/>
+              </a:spcBef>
+              <a:buNone/>
+              <a:defRPr sz="4400" kern="1200">
+                <a:solidFill>
+                  <a:schemeClr val="tx1"/>
+                </a:solidFill>
+                <a:latin typeface="+mj-lt"/>
+                <a:ea typeface="+mj-ea"/>
+                <a:cs typeface="+mj-cs"/>
+              </a:defRPr>
+            </a:lvl1pPr>
+          </a:lstStyle>
+          <a:p>
+            <a:r>
+              <a:rPr lang="en-GB" b="1" dirty="0" smtClean="0"/>
+              <a:t>Future perspective</a:t>
+            </a:r>
+            <a:endParaRPr lang="en-GB" b="1" dirty="0"/>
+          </a:p>
         </p:txBody>
       </p:sp>
     </p:spTree>
+    <p:extLst>
+      <p:ext uri="{BB962C8B-B14F-4D97-AF65-F5344CB8AC3E}">
+        <p14:creationId xmlns:p14="http://schemas.microsoft.com/office/powerpoint/2010/main" val="115400159"/>
+      </p:ext>
+    </p:extLst>
   </p:cSld>
   <p:clrMapOvr>
     <a:masterClrMapping/>
@@ -8095,11 +8187,7 @@
             </a:r>
             <a:r>
               <a:rPr lang="en-GB" sz="1500" dirty="0" smtClean="0"/>
-              <a:t> = ∞</a:t>
-            </a:r>
-            <a:r>
-              <a:rPr lang="en-GB" sz="1500" dirty="0" smtClean="0"/>
-              <a:t>)</a:t>
+              <a:t> = ∞)</a:t>
             </a:r>
           </a:p>
           <a:p>

</xml_diff>